<commit_message>
final draft presentation 2
</commit_message>
<xml_diff>
--- a/presentation2/newt-p2.pptx
+++ b/presentation2/newt-p2.pptx
@@ -31,9 +31,6 @@
     <p:sldId id="279" r:id="rId25"/>
     <p:sldId id="280" r:id="rId26"/>
     <p:sldId id="281" r:id="rId27"/>
-    <p:sldId id="282" r:id="rId28"/>
-    <p:sldId id="283" r:id="rId29"/>
-    <p:sldId id="284" r:id="rId30"/>
   </p:sldIdLst>
   <p:sldSz cx="9144000" cy="5143500" type="screen16x9"/>
   <p:notesSz cx="6858000" cy="9144000"/>
@@ -3253,7 +3250,7 @@
             </a:pPr>
             <a:r>
               <a:rPr/>
-              <a:t>How is the data model is described?</a:t>
+              <a:t>How are data models described?</a:t>
             </a:r>
           </a:p>
         </p:txBody>
@@ -3276,21 +3273,21 @@
             <a:pPr lvl="0"/>
             <a:r>
               <a:rPr/>
-              <a:t>GitHub YAML Issue Template Syntax</a:t>
-            </a:r>
-          </a:p>
-          <a:p>
-            <a:pPr lvl="1"/>
-            <a:r>
-              <a:rPr/>
-              <a:t>describes HTML</a:t>
-            </a:r>
-          </a:p>
-          <a:p>
-            <a:pPr lvl="1"/>
-            <a:r>
-              <a:rPr/>
-              <a:t>implies SQL</a:t>
+              <a:t>A model is a set of HTML form input types</a:t>
+            </a:r>
+          </a:p>
+          <a:p>
+            <a:pPr lvl="0"/>
+            <a:r>
+              <a:rPr/>
+              <a:t>Expressed using GitHub YAML Issue Template Syntax</a:t>
+            </a:r>
+          </a:p>
+          <a:p>
+            <a:pPr lvl="0"/>
+            <a:r>
+              <a:rPr/>
+              <a:t>Model describes HTML and implies SQL</a:t>
             </a:r>
           </a:p>
         </p:txBody>
@@ -3337,7 +3334,7 @@
             </a:pPr>
             <a:r>
               <a:rPr/>
-              <a:t>Step one create our YAML file</a:t>
+              <a:t>How do I think things will work?</a:t>
             </a:r>
           </a:p>
         </p:txBody>
@@ -3357,23 +3354,48 @@
           <a:bodyPr/>
           <a:lstStyle/>
           <a:p>
-            <a:pPr lvl="0" indent="0">
-              <a:buNone/>
+            <a:pPr lvl="0" indent="-342900" marL="342900">
+              <a:buAutoNum type="arabicPeriod"/>
             </a:pPr>
             <a:r>
-              <a:rPr>
-                <a:latin typeface="Courier"/>
-              </a:rPr>
-              <a:t>newt init app.yaml</a:t>
-            </a:r>
-          </a:p>
-          <a:p>
-            <a:pPr lvl="0" indent="0" marL="1270000">
-              <a:buNone/>
+              <a:rPr/>
+              <a:t>Interactively generate our application’s YAML file</a:t>
+            </a:r>
+          </a:p>
+          <a:p>
+            <a:pPr lvl="0" indent="-342900" marL="342900">
+              <a:buAutoNum type="arabicPeriod"/>
             </a:pPr>
             <a:r>
-              <a:rPr sz="2000"/>
-              <a:t>Interactively generate app.yaml</a:t>
+              <a:rPr/>
+              <a:t>Interactively define data models</a:t>
+            </a:r>
+          </a:p>
+          <a:p>
+            <a:pPr lvl="0" indent="-342900" marL="342900">
+              <a:buAutoNum type="arabicPeriod"/>
+            </a:pPr>
+            <a:r>
+              <a:rPr/>
+              <a:t>Generate our application code</a:t>
+            </a:r>
+          </a:p>
+          <a:p>
+            <a:pPr lvl="0" indent="-342900" marL="342900">
+              <a:buAutoNum type="arabicPeriod"/>
+            </a:pPr>
+            <a:r>
+              <a:rPr/>
+              <a:t>Setup Postgres and PostgREST</a:t>
+            </a:r>
+          </a:p>
+          <a:p>
+            <a:pPr lvl="0" indent="-342900" marL="342900">
+              <a:buAutoNum type="arabicPeriod"/>
+            </a:pPr>
+            <a:r>
+              <a:rPr/>
+              <a:t>Run our app with Newt</a:t>
             </a:r>
           </a:p>
         </p:txBody>
@@ -3420,7 +3442,7 @@
             </a:pPr>
             <a:r>
               <a:rPr/>
-              <a:t>Step two define our data models</a:t>
+              <a:t>Steps one and two are interactive</a:t>
             </a:r>
           </a:p>
         </p:txBody>
@@ -3447,16 +3469,8 @@
               <a:rPr>
                 <a:latin typeface="Courier"/>
               </a:rPr>
-              <a:t>newt modeler app.yaml</a:t>
-            </a:r>
-          </a:p>
-          <a:p>
-            <a:pPr lvl="0" indent="0" marL="1270000">
-              <a:buNone/>
-            </a:pPr>
-            <a:r>
-              <a:rPr sz="2000"/>
-              <a:t>Interactively model you data</a:t>
+              <a:t>  newt init app.yaml
+  newt model app.yaml</a:t>
             </a:r>
           </a:p>
         </p:txBody>
@@ -3523,44 +3537,23 @@
           <a:bodyPr/>
           <a:lstStyle/>
           <a:p>
-            <a:pPr lvl="0"/>
-            <a:r>
-              <a:rPr/>
-              <a:t>Use </a:t>
-            </a:r>
+            <a:pPr lvl="0" indent="0">
+              <a:buNone/>
+            </a:pPr>
             <a:r>
               <a:rPr>
                 <a:latin typeface="Courier"/>
               </a:rPr>
-              <a:t>newt generate</a:t>
-            </a:r>
-          </a:p>
-          <a:p>
-            <a:pPr lvl="1"/>
-            <a:r>
-              <a:rPr/>
-              <a:t>SQL</a:t>
-            </a:r>
-          </a:p>
-          <a:p>
-            <a:pPr lvl="1"/>
-            <a:r>
-              <a:rPr/>
-              <a:t>PostgREST config</a:t>
-            </a:r>
-          </a:p>
-          <a:p>
-            <a:pPr lvl="1"/>
-            <a:r>
-              <a:rPr/>
-              <a:t>Templates</a:t>
-            </a:r>
-          </a:p>
-          <a:p>
-            <a:pPr lvl="0"/>
-            <a:r>
-              <a:rPr/>
-              <a:t>Edit files if needed</a:t>
+              <a:t>  newt generate app.yaml</a:t>
+            </a:r>
+          </a:p>
+          <a:p>
+            <a:pPr lvl="0" indent="0" marL="1270000">
+              <a:buNone/>
+            </a:pPr>
+            <a:r>
+              <a:rPr sz="2000"/>
+              <a:t>Renders SQL, PostgREST conf, Mustache templates</a:t>
             </a:r>
           </a:p>
         </p:txBody>
@@ -3607,7 +3600,7 @@
             </a:pPr>
             <a:r>
               <a:rPr/>
-              <a:t>Step three, generate our SQL files, config</a:t>
+              <a:t>Step four, setup Postgres and PostgREST</a:t>
             </a:r>
           </a:p>
         </p:txBody>
@@ -3627,16 +3620,37 @@
           <a:bodyPr/>
           <a:lstStyle/>
           <a:p>
-            <a:pPr lvl="0" indent="0">
-              <a:buNone/>
+            <a:pPr lvl="0" indent="-342900" marL="342900">
+              <a:buAutoNum type="arabicPeriod"/>
             </a:pPr>
+            <a:r>
+              <a:rPr/>
+              <a:t>Use the generated SQL and configuration</a:t>
+            </a:r>
+          </a:p>
+          <a:p>
+            <a:pPr lvl="0" indent="-342900" marL="342900">
+              <a:buAutoNum type="arabicPeriod"/>
+            </a:pPr>
+            <a:r>
+              <a:rPr/>
+              <a:t>Setup and check via </a:t>
+            </a:r>
             <a:r>
               <a:rPr>
                 <a:latin typeface="Courier"/>
               </a:rPr>
-              <a:t>newt generate app.yaml postgres setup &gt;setup.sql
-newt generate app.yaml postgres models &gt;models.sql
-newt generate app.yaml postgrest &gt;postgrest.conf</a:t>
+              <a:t>createdb</a:t>
+            </a:r>
+            <a:r>
+              <a:rPr/>
+              <a:t> and </a:t>
+            </a:r>
+            <a:r>
+              <a:rPr>
+                <a:latin typeface="Courier"/>
+              </a:rPr>
+              <a:t>psql</a:t>
             </a:r>
           </a:p>
         </p:txBody>
@@ -3683,7 +3697,7 @@
             </a:pPr>
             <a:r>
               <a:rPr/>
-              <a:t>Step three, generate templates</a:t>
+              <a:t>Step four, setup Postgres and PostgREST</a:t>
             </a:r>
           </a:p>
         </p:txBody>
@@ -3710,10 +3724,19 @@
               <a:rPr>
                 <a:latin typeface="Courier"/>
               </a:rPr>
-              <a:t>newt generate app.yaml mustache \
-  create_form app &gt;create_app_form.tmpl
-newt generate app.yaml mustache \
-  create_response app &gt;create_app_response.tmpl</a:t>
+              <a:t>  createdb app
+  psql app -c '\i setup.sql'
+  psql app -c '\i models.sql'
+  psql app -c '\dt'</a:t>
+            </a:r>
+          </a:p>
+          <a:p>
+            <a:pPr lvl="0" indent="0" marL="1270000">
+              <a:buNone/>
+            </a:pPr>
+            <a:r>
+              <a:rPr sz="2000"/>
+              <a:t>should this be automated too?</a:t>
             </a:r>
           </a:p>
         </p:txBody>
@@ -3760,7 +3783,7 @@
             </a:pPr>
             <a:r>
               <a:rPr/>
-              <a:t>Step three, generate templates …</a:t>
+              <a:t>Step five, run your application and test</a:t>
             </a:r>
           </a:p>
         </p:txBody>
@@ -3787,10 +3810,16 @@
               <a:rPr>
                 <a:latin typeface="Courier"/>
               </a:rPr>
-              <a:t>newt generate app.yaml mustache \
-  update_form app &gt;update_app_form.tmpl
-newt generate app.yaml mustache \
-  update_response app &gt;update_app_response.tmpl</a:t>
+              <a:t>  newt run app.yaml</a:t>
+            </a:r>
+          </a:p>
+          <a:p>
+            <a:pPr lvl="0" indent="0" marL="1270000">
+              <a:buNone/>
+            </a:pPr>
+            <a:r>
+              <a:rPr sz="2000"/>
+              <a:t>Point your web browser at http://localhost:8010 to test</a:t>
             </a:r>
           </a:p>
         </p:txBody>
@@ -3837,7 +3866,7 @@
             </a:pPr>
             <a:r>
               <a:rPr/>
-              <a:t>Step three, generate templates …</a:t>
+              <a:t>Can I run a demo?</a:t>
             </a:r>
           </a:p>
         </p:txBody>
@@ -3857,17 +3886,12 @@
           <a:bodyPr/>
           <a:lstStyle/>
           <a:p>
-            <a:pPr lvl="0" indent="0">
+            <a:pPr lvl="0" indent="0" marL="0">
               <a:buNone/>
             </a:pPr>
             <a:r>
-              <a:rPr>
-                <a:latin typeface="Courier"/>
-              </a:rPr>
-              <a:t>newt generate app.yaml mustache \
-  delete_form app &gt;delete_app_form.tmpl
-newt generate app.yaml mustache \
-  delete_response app &gt;delete_app_response.tmpl</a:t>
+              <a:rPr/>
+              <a:t>Not yet, hopefully in late May 2024.</a:t>
             </a:r>
           </a:p>
         </p:txBody>
@@ -3914,7 +3938,7 @@
             </a:pPr>
             <a:r>
               <a:rPr/>
-              <a:t>Step three, generate templates … finally</a:t>
+              <a:t>Second prototype Status</a:t>
             </a:r>
           </a:p>
         </p:txBody>
@@ -3934,15 +3958,24 @@
           <a:bodyPr/>
           <a:lstStyle/>
           <a:p>
-            <a:pPr lvl="0" indent="0">
-              <a:buNone/>
-            </a:pPr>
-            <a:r>
-              <a:rPr>
-                <a:latin typeface="Courier"/>
-              </a:rPr>
-              <a:t>newt generate app.yaml mustache read app &gt;read_app.tmpl
-newt generate app.yaml mustache list app &gt;list_app.tmpl</a:t>
+            <a:pPr lvl="0"/>
+            <a:r>
+              <a:rPr/>
+              <a:t>A work in progress (April 2024)</a:t>
+            </a:r>
+          </a:p>
+          <a:p>
+            <a:pPr lvl="0"/>
+            <a:r>
+              <a:rPr/>
+              <a:t>Working prototype target date June 2024</a:t>
+            </a:r>
+          </a:p>
+          <a:p>
+            <a:pPr lvl="0"/>
+            <a:r>
+              <a:rPr/>
+              <a:t>Using internal applications as test bed</a:t>
             </a:r>
           </a:p>
         </p:txBody>
@@ -3989,7 +4022,7 @@
             </a:pPr>
             <a:r>
               <a:rPr/>
-              <a:t>Step three, generate templates</a:t>
+              <a:t>How much is built?</a:t>
             </a:r>
           </a:p>
         </p:txBody>
@@ -4009,12 +4042,38 @@
           <a:bodyPr/>
           <a:lstStyle/>
           <a:p>
-            <a:pPr lvl="0" indent="0" marL="1270000">
-              <a:buNone/>
-            </a:pPr>
-            <a:r>
-              <a:rPr sz="2000"/>
-              <a:t>code generation should be fully automated</a:t>
+            <a:pPr lvl="0"/>
+            <a:r>
+              <a:rPr/>
+              <a:t>☒ Newt developer tool</a:t>
+            </a:r>
+          </a:p>
+          <a:p>
+            <a:pPr lvl="0"/>
+            <a:r>
+              <a:rPr/>
+              <a:t>☒ Router is implemented and working</a:t>
+            </a:r>
+          </a:p>
+          <a:p>
+            <a:pPr lvl="0"/>
+            <a:r>
+              <a:rPr/>
+              <a:t>☒ Mustache template engine is working</a:t>
+            </a:r>
+          </a:p>
+          <a:p>
+            <a:pPr lvl="0"/>
+            <a:r>
+              <a:rPr/>
+              <a:t>☐ Generator development (in progress)</a:t>
+            </a:r>
+          </a:p>
+          <a:p>
+            <a:pPr lvl="0"/>
+            <a:r>
+              <a:rPr/>
+              <a:t>☐ Modeler (design stage)</a:t>
             </a:r>
           </a:p>
         </p:txBody>
@@ -4061,7 +4120,7 @@
             </a:pPr>
             <a:r>
               <a:rPr/>
-              <a:t>Goal: Answer a question.</a:t>
+              <a:t>What is Newt?</a:t>
             </a:r>
           </a:p>
         </p:txBody>
@@ -4081,12 +4140,24 @@
           <a:bodyPr/>
           <a:lstStyle/>
           <a:p>
-            <a:pPr lvl="0" indent="0" marL="0">
-              <a:buNone/>
-            </a:pPr>
-            <a:r>
-              <a:rPr/>
-              <a:t>Is Newt and “off the shelf” enough?</a:t>
+            <a:pPr lvl="0"/>
+            <a:r>
+              <a:rPr/>
+              <a:t>A rapid application develop tool</a:t>
+            </a:r>
+          </a:p>
+          <a:p>
+            <a:pPr lvl="1"/>
+            <a:r>
+              <a:rPr/>
+              <a:t>for applications that curate metadata</a:t>
+            </a:r>
+          </a:p>
+          <a:p>
+            <a:pPr lvl="0"/>
+            <a:r>
+              <a:rPr/>
+              <a:t>Audience: Libraries, Archives and Museums</a:t>
             </a:r>
           </a:p>
         </p:txBody>
@@ -4133,7 +4204,7 @@
             </a:pPr>
             <a:r>
               <a:rPr/>
-              <a:t>Step four, run our SQL</a:t>
+              <a:t>Insights from prototypes 1 &amp; 2</a:t>
             </a:r>
           </a:p>
         </p:txBody>
@@ -4153,36 +4224,17 @@
           <a:bodyPr/>
           <a:lstStyle/>
           <a:p>
-            <a:pPr lvl="0" indent="0">
-              <a:buNone/>
-            </a:pPr>
-            <a:r>
-              <a:rPr>
-                <a:latin typeface="Courier"/>
-              </a:rPr>
-              <a:t>createdb app
-psql app -c '\i setup.sql'
-psql app -c '\i models.sql'
-psql app -c '\dt'</a:t>
-            </a:r>
-          </a:p>
-          <a:p>
-            <a:pPr lvl="0" indent="0" marL="1270000">
-              <a:buNone/>
-            </a:pPr>
-            <a:r>
-              <a:rPr sz="2000"/>
-              <a:t>this should be automated with the </a:t>
-            </a:r>
-            <a:r>
-              <a:rPr sz="2000">
-                <a:latin typeface="Courier"/>
-              </a:rPr>
-              <a:t>newt</a:t>
-            </a:r>
-            <a:r>
-              <a:rPr sz="2000"/>
-              <a:t> command</a:t>
+            <a:pPr lvl="0"/>
+            <a:r>
+              <a:rPr/>
+              <a:t>“Off the shelf” is simpler</a:t>
+            </a:r>
+          </a:p>
+          <a:p>
+            <a:pPr lvl="0"/>
+            <a:r>
+              <a:rPr/>
+              <a:t>Lots of typing discourages use</a:t>
             </a:r>
           </a:p>
         </p:txBody>
@@ -4229,7 +4281,7 @@
             </a:pPr>
             <a:r>
               <a:rPr/>
-              <a:t>Step five, run newt and test</a:t>
+              <a:t>Insights from prototypes 1 &amp; 2</a:t>
             </a:r>
           </a:p>
         </p:txBody>
@@ -4249,28 +4301,31 @@
           <a:bodyPr/>
           <a:lstStyle/>
           <a:p>
-            <a:pPr lvl="0" indent="0">
-              <a:buNone/>
-            </a:pPr>
-            <a:r>
-              <a:rPr>
-                <a:latin typeface="Courier"/>
-              </a:rPr>
-              <a:t>newt run app.yaml</a:t>
-            </a:r>
-          </a:p>
-          <a:p>
-            <a:pPr lvl="0"/>
-            <a:r>
-              <a:rPr/>
-              <a:t>fire up newt, test and debug</a:t>
-            </a:r>
-          </a:p>
-          <a:p>
-            <a:pPr lvl="0"/>
-            <a:r>
-              <a:rPr/>
-              <a:t>web browser</a:t>
+            <a:pPr lvl="0"/>
+            <a:r>
+              <a:rPr/>
+              <a:t>SQL turns people off, use a code generator</a:t>
+            </a:r>
+          </a:p>
+          <a:p>
+            <a:pPr lvl="0"/>
+            <a:r>
+              <a:rPr/>
+              <a:t>Hand typing templates is a turn off, use a code generator</a:t>
+            </a:r>
+          </a:p>
+          <a:p>
+            <a:pPr lvl="0"/>
+            <a:r>
+              <a:rPr/>
+              <a:t>Large YAML structures benefit from code generation</a:t>
+            </a:r>
+          </a:p>
+          <a:p>
+            <a:pPr lvl="0"/>
+            <a:r>
+              <a:rPr/>
+              <a:t>Automatic “wiring up” of routes and templates very helpful</a:t>
             </a:r>
           </a:p>
         </p:txBody>
@@ -4317,7 +4372,7 @@
             </a:pPr>
             <a:r>
               <a:rPr/>
-              <a:t>Insights from prototypes 1 &amp; 2</a:t>
+              <a:t>What’s next to wrap up prototype 2?</a:t>
             </a:r>
           </a:p>
         </p:txBody>
@@ -4340,35 +4395,14 @@
             <a:pPr lvl="0"/>
             <a:r>
               <a:rPr/>
-              <a:t>“Off the shelf” is simpler</a:t>
-            </a:r>
-          </a:p>
-          <a:p>
-            <a:pPr lvl="0"/>
-            <a:r>
-              <a:rPr/>
-              <a:t>Large YAML structures benefit from code generation</a:t>
-            </a:r>
-          </a:p>
-          <a:p>
-            <a:pPr lvl="0"/>
-            <a:r>
-              <a:rPr/>
-              <a:t>SQL turns people off, use a code generator</a:t>
-            </a:r>
-          </a:p>
-          <a:p>
-            <a:pPr lvl="0"/>
-            <a:r>
-              <a:rPr/>
-              <a:t>Mustache/HTML needs a code generator</a:t>
-            </a:r>
-          </a:p>
-          <a:p>
-            <a:pPr lvl="0"/>
-            <a:r>
-              <a:rPr/>
-              <a:t>Automatic “wiring up” of routes and templates is helpful</a:t>
+              <a:t>Debug and improve the code generator</a:t>
+            </a:r>
+          </a:p>
+          <a:p>
+            <a:pPr lvl="0"/>
+            <a:r>
+              <a:rPr/>
+              <a:t>Implement a data modeler</a:t>
             </a:r>
           </a:p>
         </p:txBody>
@@ -4415,7 +4449,7 @@
             </a:pPr>
             <a:r>
               <a:rPr/>
-              <a:t>Lessons learned, so far</a:t>
+              <a:t>Unanswered Questions</a:t>
             </a:r>
           </a:p>
         </p:txBody>
@@ -4438,28 +4472,35 @@
             <a:pPr lvl="0"/>
             <a:r>
               <a:rPr/>
-              <a:t>Managing routes and pipelines has a cognitive price</a:t>
-            </a:r>
-          </a:p>
-          <a:p>
-            <a:pPr lvl="0"/>
-            <a:r>
-              <a:rPr/>
-              <a:t>Keep your pipelines short</a:t>
-            </a:r>
-          </a:p>
-          <a:p>
-            <a:pPr lvl="0"/>
-            <a:r>
-              <a:rPr/>
-              <a:t>Web services need a “developer” mode for debugging</a:t>
-            </a:r>
-          </a:p>
-          <a:p>
-            <a:pPr lvl="0"/>
-            <a:r>
-              <a:rPr/>
-              <a:t>Lots of typing discourages use</a:t>
+              <a:t>What should be the minimum knowledge needed to use Newt?</a:t>
+            </a:r>
+          </a:p>
+          <a:p>
+            <a:pPr lvl="0"/>
+            <a:r>
+              <a:rPr/>
+              <a:t>What should come out of the box with Newt?</a:t>
+            </a:r>
+          </a:p>
+          <a:p>
+            <a:pPr lvl="1"/>
+            <a:r>
+              <a:rPr/>
+              <a:t>GUI tools?</a:t>
+            </a:r>
+          </a:p>
+          <a:p>
+            <a:pPr lvl="1"/>
+            <a:r>
+              <a:rPr/>
+              <a:t>Web components?</a:t>
+            </a:r>
+          </a:p>
+          <a:p>
+            <a:pPr lvl="1"/>
+            <a:r>
+              <a:rPr/>
+              <a:t>Ready made apps?</a:t>
             </a:r>
           </a:p>
         </p:txBody>
@@ -4506,7 +4547,7 @@
             </a:pPr>
             <a:r>
               <a:rPr/>
-              <a:t>What’s next to wrap up prototype 2?</a:t>
+              <a:t>Someday, maybe ideas</a:t>
             </a:r>
           </a:p>
         </p:txBody>
@@ -4529,21 +4570,28 @@
             <a:pPr lvl="0"/>
             <a:r>
               <a:rPr/>
-              <a:t>Finish/improve the code generator</a:t>
-            </a:r>
-          </a:p>
-          <a:p>
-            <a:pPr lvl="0"/>
-            <a:r>
-              <a:rPr/>
-              <a:t>Implement a data modeler</a:t>
-            </a:r>
-          </a:p>
-          <a:p>
-            <a:pPr lvl="0"/>
-            <a:r>
-              <a:rPr/>
-              <a:t>Less typing!</a:t>
+              <a:t>SQLite 3 database support</a:t>
+            </a:r>
+          </a:p>
+          <a:p>
+            <a:pPr lvl="0"/>
+            <a:r>
+              <a:rPr/>
+              <a:t>A S3 protocol web service implementing object storage using OCFL</a:t>
+            </a:r>
+          </a:p>
+          <a:p>
+            <a:pPr lvl="0"/>
+            <a:r>
+              <a:rPr/>
+              <a:t>Web components for library, archive and museum metadata types</a:t>
+            </a:r>
+          </a:p>
+          <a:p>
+            <a:pPr lvl="0"/>
+            <a:r>
+              <a:rPr/>
+              <a:t>Visual programming would be easier than editing YAML files</a:t>
             </a:r>
           </a:p>
         </p:txBody>
@@ -4590,7 +4638,7 @@
             </a:pPr>
             <a:r>
               <a:rPr/>
-              <a:t>Newt’s challenges</a:t>
+              <a:t>Related resources</a:t>
             </a:r>
           </a:p>
         </p:txBody>
@@ -4613,22 +4661,49 @@
             <a:pPr lvl="0"/>
             <a:r>
               <a:rPr/>
-              <a:t>Newt is </a:t>
-            </a:r>
-            <a:r>
-              <a:rPr b="1"/>
-              <a:t>a work in progress</a:t>
-            </a:r>
-            <a:r>
-              <a:rPr/>
-              <a:t> (April 2024)</a:t>
-            </a:r>
-          </a:p>
-          <a:p>
-            <a:pPr lvl="0"/>
-            <a:r>
-              <a:rPr/>
-              <a:t>Newt is missing file upload support</a:t>
+              <a:t>Newt </a:t>
+            </a:r>
+            <a:r>
+              <a:rPr>
+                <a:hlinkClick r:id="rId2"/>
+              </a:rPr>
+              <a:t>https://github.com/caltechlibrary/newt</a:t>
+            </a:r>
+          </a:p>
+          <a:p>
+            <a:pPr lvl="0"/>
+            <a:r>
+              <a:rPr/>
+              <a:t>Postgres </a:t>
+            </a:r>
+            <a:r>
+              <a:rPr>
+                <a:hlinkClick r:id="rId3"/>
+              </a:rPr>
+              <a:t>https://postgres.org</a:t>
+            </a:r>
+            <a:r>
+              <a:rPr/>
+              <a:t> + PostgREST </a:t>
+            </a:r>
+            <a:r>
+              <a:rPr>
+                <a:hlinkClick r:id="rId4"/>
+              </a:rPr>
+              <a:t>https://postgrest.org</a:t>
+            </a:r>
+          </a:p>
+          <a:p>
+            <a:pPr lvl="0"/>
+            <a:r>
+              <a:rPr>
+                <a:hlinkClick r:id="rId5"/>
+              </a:rPr>
+              <a:t>Mustache</a:t>
+            </a:r>
+            <a:r>
+              <a:rPr/>
+              <a:t> programming languages support</a:t>
             </a:r>
           </a:p>
         </p:txBody>
@@ -4675,320 +4750,6 @@
             </a:pPr>
             <a:r>
               <a:rPr/>
-              <a:t>Unanswered Questions</a:t>
-            </a:r>
-          </a:p>
-        </p:txBody>
-      </p:sp>
-      <p:sp>
-        <p:nvSpPr>
-          <p:cNvPr id="3" name="Content Placeholder 2"/>
-          <p:cNvSpPr>
-            <a:spLocks noGrp="1"/>
-          </p:cNvSpPr>
-          <p:nvPr>
-            <p:ph idx="1"/>
-          </p:nvPr>
-        </p:nvSpPr>
-        <p:spPr/>
-        <p:txBody>
-          <a:bodyPr/>
-          <a:lstStyle/>
-          <a:p>
-            <a:pPr lvl="0"/>
-            <a:r>
-              <a:rPr/>
-              <a:t>What is the minimum knowledge needed to use Newt?</a:t>
-            </a:r>
-          </a:p>
-          <a:p>
-            <a:pPr lvl="0"/>
-            <a:r>
-              <a:rPr/>
-              <a:t>What should come out of the box with Newt?</a:t>
-            </a:r>
-          </a:p>
-          <a:p>
-            <a:pPr lvl="1"/>
-            <a:r>
-              <a:rPr/>
-              <a:t>GUI tools?</a:t>
-            </a:r>
-          </a:p>
-          <a:p>
-            <a:pPr lvl="1"/>
-            <a:r>
-              <a:rPr/>
-              <a:t>Web components?</a:t>
-            </a:r>
-          </a:p>
-          <a:p>
-            <a:pPr lvl="1"/>
-            <a:r>
-              <a:rPr/>
-              <a:t>Ready made apps?</a:t>
-            </a:r>
-          </a:p>
-        </p:txBody>
-      </p:sp>
-    </p:spTree>
-  </p:cSld>
-</p:sld>
-</file>
-
-<file path=ppt/slides/slide27.xml><?xml version="1.0" encoding="utf-8"?>
-<p:sld xmlns:a="http://schemas.openxmlformats.org/drawingml/2006/main" xmlns:r="http://schemas.openxmlformats.org/officeDocument/2006/relationships" xmlns:p="http://schemas.openxmlformats.org/presentationml/2006/main">
-  <p:cSld>
-    <p:spTree>
-      <p:nvGrpSpPr>
-        <p:cNvPr id="1" name=""/>
-        <p:cNvGrpSpPr/>
-        <p:nvPr/>
-      </p:nvGrpSpPr>
-      <p:grpSpPr>
-        <a:xfrm>
-          <a:off x="0" y="0"/>
-          <a:ext cx="0" cy="0"/>
-          <a:chOff x="0" y="0"/>
-          <a:chExt cx="0" cy="0"/>
-        </a:xfrm>
-      </p:grpSpPr>
-      <p:sp>
-        <p:nvSpPr>
-          <p:cNvPr id="2" name="Title 1"/>
-          <p:cNvSpPr>
-            <a:spLocks noGrp="1"/>
-          </p:cNvSpPr>
-          <p:nvPr>
-            <p:ph type="title"/>
-          </p:nvPr>
-        </p:nvSpPr>
-        <p:spPr/>
-        <p:txBody>
-          <a:bodyPr/>
-          <a:lstStyle/>
-          <a:p>
-            <a:pPr lvl="0" indent="0" marL="0">
-              <a:buNone/>
-            </a:pPr>
-            <a:r>
-              <a:rPr/>
-              <a:t>My wish list …</a:t>
-            </a:r>
-          </a:p>
-        </p:txBody>
-      </p:sp>
-      <p:sp>
-        <p:nvSpPr>
-          <p:cNvPr id="3" name="Content Placeholder 2"/>
-          <p:cNvSpPr>
-            <a:spLocks noGrp="1"/>
-          </p:cNvSpPr>
-          <p:nvPr>
-            <p:ph idx="1"/>
-          </p:nvPr>
-        </p:nvSpPr>
-        <p:spPr/>
-        <p:txBody>
-          <a:bodyPr/>
-          <a:lstStyle/>
-          <a:p>
-            <a:pPr lvl="0"/>
-            <a:r>
-              <a:rPr/>
-              <a:t>SQLite 3 database support</a:t>
-            </a:r>
-          </a:p>
-          <a:p>
-            <a:pPr lvl="0"/>
-            <a:r>
-              <a:rPr/>
-              <a:t>Visually programming would be easier than writing YAML files</a:t>
-            </a:r>
-          </a:p>
-          <a:p>
-            <a:pPr lvl="0"/>
-            <a:r>
-              <a:rPr/>
-              <a:t>Web components for gallery, library, archive and museum metadata types</a:t>
-            </a:r>
-          </a:p>
-          <a:p>
-            <a:pPr lvl="0"/>
-            <a:r>
-              <a:rPr/>
-              <a:t>A simple S3 protocol web service that implements storing object using OCFL</a:t>
-            </a:r>
-          </a:p>
-        </p:txBody>
-      </p:sp>
-    </p:spTree>
-  </p:cSld>
-</p:sld>
-</file>
-
-<file path=ppt/slides/slide28.xml><?xml version="1.0" encoding="utf-8"?>
-<p:sld xmlns:a="http://schemas.openxmlformats.org/drawingml/2006/main" xmlns:r="http://schemas.openxmlformats.org/officeDocument/2006/relationships" xmlns:p="http://schemas.openxmlformats.org/presentationml/2006/main">
-  <p:cSld>
-    <p:spTree>
-      <p:nvGrpSpPr>
-        <p:cNvPr id="1" name=""/>
-        <p:cNvGrpSpPr/>
-        <p:nvPr/>
-      </p:nvGrpSpPr>
-      <p:grpSpPr>
-        <a:xfrm>
-          <a:off x="0" y="0"/>
-          <a:ext cx="0" cy="0"/>
-          <a:chOff x="0" y="0"/>
-          <a:chExt cx="0" cy="0"/>
-        </a:xfrm>
-      </p:grpSpPr>
-      <p:sp>
-        <p:nvSpPr>
-          <p:cNvPr id="2" name="Title 1"/>
-          <p:cNvSpPr>
-            <a:spLocks noGrp="1"/>
-          </p:cNvSpPr>
-          <p:nvPr>
-            <p:ph type="title"/>
-          </p:nvPr>
-        </p:nvSpPr>
-        <p:spPr/>
-        <p:txBody>
-          <a:bodyPr/>
-          <a:lstStyle/>
-          <a:p>
-            <a:pPr lvl="0" indent="0" marL="0">
-              <a:buNone/>
-            </a:pPr>
-            <a:r>
-              <a:rPr/>
-              <a:t>Related resources</a:t>
-            </a:r>
-          </a:p>
-        </p:txBody>
-      </p:sp>
-      <p:sp>
-        <p:nvSpPr>
-          <p:cNvPr id="3" name="Content Placeholder 2"/>
-          <p:cNvSpPr>
-            <a:spLocks noGrp="1"/>
-          </p:cNvSpPr>
-          <p:nvPr>
-            <p:ph idx="1"/>
-          </p:nvPr>
-        </p:nvSpPr>
-        <p:spPr/>
-        <p:txBody>
-          <a:bodyPr/>
-          <a:lstStyle/>
-          <a:p>
-            <a:pPr lvl="0"/>
-            <a:r>
-              <a:rPr/>
-              <a:t>Newt </a:t>
-            </a:r>
-            <a:r>
-              <a:rPr>
-                <a:hlinkClick r:id="rId2"/>
-              </a:rPr>
-              <a:t>https://github.com/caltechlibrary/newt</a:t>
-            </a:r>
-          </a:p>
-          <a:p>
-            <a:pPr lvl="0"/>
-            <a:r>
-              <a:rPr/>
-              <a:t>Postgres </a:t>
-            </a:r>
-            <a:r>
-              <a:rPr>
-                <a:hlinkClick r:id="rId3"/>
-              </a:rPr>
-              <a:t>https://postgres.org</a:t>
-            </a:r>
-            <a:r>
-              <a:rPr/>
-              <a:t> + PostgREST </a:t>
-            </a:r>
-            <a:r>
-              <a:rPr>
-                <a:hlinkClick r:id="rId4"/>
-              </a:rPr>
-              <a:t>https://postgrest.org</a:t>
-            </a:r>
-          </a:p>
-          <a:p>
-            <a:pPr lvl="0"/>
-            <a:r>
-              <a:rPr>
-                <a:hlinkClick r:id="rId5"/>
-              </a:rPr>
-              <a:t>Mustache</a:t>
-            </a:r>
-            <a:r>
-              <a:rPr/>
-              <a:t> programming languages support</a:t>
-            </a:r>
-          </a:p>
-          <a:p>
-            <a:pPr lvl="0"/>
-            <a:r>
-              <a:rPr/>
-              <a:t>Go 1.22, pattern language in HTTP handlers, see </a:t>
-            </a:r>
-            <a:r>
-              <a:rPr>
-                <a:hlinkClick r:id="rId6"/>
-              </a:rPr>
-              <a:t>https://pkg.go.dev/net/http#hdr-Patterns</a:t>
-            </a:r>
-          </a:p>
-        </p:txBody>
-      </p:sp>
-    </p:spTree>
-  </p:cSld>
-</p:sld>
-</file>
-
-<file path=ppt/slides/slide29.xml><?xml version="1.0" encoding="utf-8"?>
-<p:sld xmlns:a="http://schemas.openxmlformats.org/drawingml/2006/main" xmlns:r="http://schemas.openxmlformats.org/officeDocument/2006/relationships" xmlns:p="http://schemas.openxmlformats.org/presentationml/2006/main">
-  <p:cSld>
-    <p:spTree>
-      <p:nvGrpSpPr>
-        <p:cNvPr id="1" name=""/>
-        <p:cNvGrpSpPr/>
-        <p:nvPr/>
-      </p:nvGrpSpPr>
-      <p:grpSpPr>
-        <a:xfrm>
-          <a:off x="0" y="0"/>
-          <a:ext cx="0" cy="0"/>
-          <a:chOff x="0" y="0"/>
-          <a:chExt cx="0" cy="0"/>
-        </a:xfrm>
-      </p:grpSpPr>
-      <p:sp>
-        <p:nvSpPr>
-          <p:cNvPr id="2" name="Title 1"/>
-          <p:cNvSpPr>
-            <a:spLocks noGrp="1"/>
-          </p:cNvSpPr>
-          <p:nvPr>
-            <p:ph type="title"/>
-          </p:nvPr>
-        </p:nvSpPr>
-        <p:spPr/>
-        <p:txBody>
-          <a:bodyPr/>
-          <a:lstStyle/>
-          <a:p>
-            <a:pPr lvl="0" indent="0" marL="0">
-              <a:buNone/>
-            </a:pPr>
-            <a:r>
-              <a:rPr/>
               <a:t>Thank you!</a:t>
             </a:r>
           </a:p>
@@ -5118,7 +4879,7 @@
             </a:pPr>
             <a:r>
               <a:rPr/>
-              <a:t>How I am proceeding</a:t>
+              <a:t>Goal of Prototype 2: Answer the question.</a:t>
             </a:r>
           </a:p>
         </p:txBody>
@@ -5138,24 +4899,12 @@
           <a:bodyPr/>
           <a:lstStyle/>
           <a:p>
-            <a:pPr lvl="0"/>
-            <a:r>
-              <a:rPr/>
-              <a:t>Pick Simple = (No coding) + (Less coding)</a:t>
-            </a:r>
-          </a:p>
-          <a:p>
-            <a:pPr lvl="0"/>
-            <a:r>
-              <a:rPr/>
-              <a:t>Avoid inventing new things</a:t>
-            </a:r>
-          </a:p>
-          <a:p>
-            <a:pPr lvl="0"/>
-            <a:r>
-              <a:rPr/>
-              <a:t>Compose applications using data pipelines and templates</a:t>
+            <a:pPr lvl="0" indent="0" marL="0">
+              <a:buNone/>
+            </a:pPr>
+            <a:r>
+              <a:rPr/>
+              <a:t>Is Newt and “off the shelf” software enough to create metadata curation applications?</a:t>
             </a:r>
           </a:p>
         </p:txBody>
@@ -5202,7 +4951,7 @@
             </a:pPr>
             <a:r>
               <a:rPr/>
-              <a:t>Off the shelf (no coding)</a:t>
+              <a:t>High level Concepts</a:t>
             </a:r>
           </a:p>
         </p:txBody>
@@ -5224,53 +4973,15 @@
           <a:p>
             <a:pPr lvl="0"/>
             <a:r>
-              <a:rPr>
-                <a:hlinkClick r:id="rId2"/>
-              </a:rPr>
-              <a:t>Postgres</a:t>
-            </a:r>
-            <a:r>
-              <a:rPr/>
-              <a:t> or </a:t>
-            </a:r>
-            <a:r>
-              <a:rPr>
-                <a:hlinkClick r:id="rId3"/>
-              </a:rPr>
-              <a:t>PostgREST</a:t>
-            </a:r>
-          </a:p>
-          <a:p>
-            <a:pPr lvl="0"/>
-            <a:r>
-              <a:rPr>
-                <a:hlinkClick r:id="rId4"/>
-              </a:rPr>
-              <a:t>Solr</a:t>
-            </a:r>
-            <a:r>
-              <a:rPr/>
-              <a:t> or </a:t>
-            </a:r>
-            <a:r>
-              <a:rPr>
-                <a:hlinkClick r:id="rId5"/>
-              </a:rPr>
-              <a:t>OpenSearch</a:t>
-            </a:r>
-          </a:p>
-          <a:p>
-            <a:pPr lvl="0"/>
-            <a:r>
-              <a:rPr/>
-              <a:t>Newt Mustache =&gt; Transform JSON into web pages</a:t>
-            </a:r>
-          </a:p>
-          <a:p>
-            <a:pPr lvl="0"/>
-            <a:r>
-              <a:rPr/>
-              <a:t>Newt Router, ties it all together</a:t>
+              <a:rPr/>
+              <a:t>describe the application you want</a:t>
+            </a:r>
+          </a:p>
+          <a:p>
+            <a:pPr lvl="0"/>
+            <a:r>
+              <a:rPr/>
+              <a:t>generate the application you described</a:t>
             </a:r>
           </a:p>
         </p:txBody>
@@ -5317,7 +5028,7 @@
             </a:pPr>
             <a:r>
               <a:rPr/>
-              <a:t>Assembling it with YAML (less coding)</a:t>
+              <a:t>Implementation Concepts</a:t>
             </a:r>
           </a:p>
         </p:txBody>
@@ -5340,28 +5051,28 @@
             <a:pPr lvl="0"/>
             <a:r>
               <a:rPr/>
-              <a:t>GitHub YAML issue template syntax described data models</a:t>
-            </a:r>
-          </a:p>
-          <a:p>
-            <a:pPr lvl="0"/>
-            <a:r>
-              <a:rPr/>
-              <a:t>YAML describes configuration, routes, pipelines</a:t>
-            </a:r>
-          </a:p>
-          <a:p>
-            <a:pPr lvl="0"/>
-            <a:r>
-              <a:rPr/>
-              <a:t>Template language is now Mustache</a:t>
-            </a:r>
-          </a:p>
-          <a:p>
-            <a:pPr lvl="0"/>
-            <a:r>
-              <a:rPr/>
-              <a:t>Code generation, “look Mom, no AI!”</a:t>
+              <a:t>data sources</a:t>
+            </a:r>
+          </a:p>
+          <a:p>
+            <a:pPr lvl="0"/>
+            <a:r>
+              <a:rPr/>
+              <a:t>data models</a:t>
+            </a:r>
+          </a:p>
+          <a:p>
+            <a:pPr lvl="0"/>
+            <a:r>
+              <a:rPr/>
+              <a:t>routing requests through data pipelines</a:t>
+            </a:r>
+          </a:p>
+          <a:p>
+            <a:pPr lvl="0"/>
+            <a:r>
+              <a:rPr/>
+              <a:t>rendering JSON responses via template engine</a:t>
             </a:r>
           </a:p>
         </p:txBody>
@@ -5408,7 +5119,7 @@
             </a:pPr>
             <a:r>
               <a:rPr/>
-              <a:t>Second prototype status</a:t>
+              <a:t>Themes</a:t>
             </a:r>
           </a:p>
         </p:txBody>
@@ -5431,21 +5142,21 @@
             <a:pPr lvl="0"/>
             <a:r>
               <a:rPr/>
-              <a:t>A work in progress (April 2024)</a:t>
-            </a:r>
-          </a:p>
-          <a:p>
-            <a:pPr lvl="0"/>
-            <a:r>
-              <a:rPr/>
-              <a:t>Hope to have a working prototype by June 2024</a:t>
-            </a:r>
-          </a:p>
-          <a:p>
-            <a:pPr lvl="0"/>
-            <a:r>
-              <a:rPr/>
-              <a:t>Internal applications will serve as test bed</a:t>
+              <a:t>Pick Simple = (No coding) + (Less coding)</a:t>
+            </a:r>
+          </a:p>
+          <a:p>
+            <a:pPr lvl="0"/>
+            <a:r>
+              <a:rPr/>
+              <a:t>Compose applications using data pipelines and templates</a:t>
+            </a:r>
+          </a:p>
+          <a:p>
+            <a:pPr lvl="0"/>
+            <a:r>
+              <a:rPr/>
+              <a:t>Avoid inventing new things</a:t>
             </a:r>
           </a:p>
         </p:txBody>
@@ -5492,7 +5203,7 @@
             </a:pPr>
             <a:r>
               <a:rPr/>
-              <a:t>Is there a Demo I can run?</a:t>
+              <a:t>Off the shelf (no coding)</a:t>
             </a:r>
           </a:p>
         </p:txBody>
@@ -5512,12 +5223,55 @@
           <a:bodyPr/>
           <a:lstStyle/>
           <a:p>
-            <a:pPr lvl="0" indent="0" marL="0">
-              <a:buNone/>
-            </a:pPr>
-            <a:r>
-              <a:rPr/>
-              <a:t>Not yet, hopefully soon.</a:t>
+            <a:pPr lvl="0"/>
+            <a:r>
+              <a:rPr>
+                <a:hlinkClick r:id="rId2"/>
+              </a:rPr>
+              <a:t>Postgres</a:t>
+            </a:r>
+            <a:r>
+              <a:rPr/>
+              <a:t> and </a:t>
+            </a:r>
+            <a:r>
+              <a:rPr>
+                <a:hlinkClick r:id="rId3"/>
+              </a:rPr>
+              <a:t>PostgREST</a:t>
+            </a:r>
+          </a:p>
+          <a:p>
+            <a:pPr lvl="0"/>
+            <a:r>
+              <a:rPr>
+                <a:hlinkClick r:id="rId4"/>
+              </a:rPr>
+              <a:t>Solr</a:t>
+            </a:r>
+            <a:r>
+              <a:rPr/>
+              <a:t> or </a:t>
+            </a:r>
+            <a:r>
+              <a:rPr>
+                <a:hlinkClick r:id="rId5"/>
+              </a:rPr>
+              <a:t>OpenSearch</a:t>
+            </a:r>
+          </a:p>
+          <a:p>
+            <a:pPr lvl="0"/>
+            <a:r>
+              <a:rPr/>
+              <a:t>Newt Mustache =&gt; Transform JSON into web pages</a:t>
+            </a:r>
+          </a:p>
+          <a:p>
+            <a:pPr lvl="0"/>
+            <a:r>
+              <a:rPr/>
+              <a:t>Newt Router, ties it all together</a:t>
             </a:r>
           </a:p>
         </p:txBody>
@@ -5564,7 +5318,7 @@
             </a:pPr>
             <a:r>
               <a:rPr/>
-              <a:t>What’s working, what’s not?</a:t>
+              <a:t>Office the shelf (other data sources)</a:t>
             </a:r>
           </a:p>
         </p:txBody>
@@ -5587,21 +5341,14 @@
             <a:pPr lvl="0"/>
             <a:r>
               <a:rPr/>
-              <a:t>☒ Router is implemented and working</a:t>
-            </a:r>
-          </a:p>
-          <a:p>
-            <a:pPr lvl="0"/>
-            <a:r>
-              <a:rPr/>
-              <a:t>☒ Mustache template engine is working</a:t>
-            </a:r>
-          </a:p>
-          <a:p>
-            <a:pPr lvl="0"/>
-            <a:r>
-              <a:rPr/>
-              <a:t>☐ Generator development, in progress</a:t>
+              <a:t>ArchivesSpace, RDM -&gt; JSON API</a:t>
+            </a:r>
+          </a:p>
+          <a:p>
+            <a:pPr lvl="0"/>
+            <a:r>
+              <a:rPr/>
+              <a:t>ORCID, ROR, CrossRef, DataCite -&gt; JSON API</a:t>
             </a:r>
           </a:p>
         </p:txBody>
@@ -5648,7 +5395,7 @@
             </a:pPr>
             <a:r>
               <a:rPr/>
-              <a:t>How do I think things will work?</a:t>
+              <a:t>Assemble app from YAML (less coding)</a:t>
             </a:r>
           </a:p>
         </p:txBody>
@@ -5668,48 +5415,24 @@
           <a:bodyPr/>
           <a:lstStyle/>
           <a:p>
-            <a:pPr lvl="0" indent="-342900" marL="342900">
-              <a:buAutoNum type="arabicPeriod"/>
-            </a:pPr>
-            <a:r>
-              <a:rPr/>
-              <a:t>Generate our app YAML</a:t>
-            </a:r>
-          </a:p>
-          <a:p>
-            <a:pPr lvl="0" indent="-342900" marL="342900">
-              <a:buAutoNum type="arabicPeriod"/>
-            </a:pPr>
-            <a:r>
-              <a:rPr/>
-              <a:t>Designing our data models</a:t>
-            </a:r>
-          </a:p>
-          <a:p>
-            <a:pPr lvl="0" indent="-342900" marL="342900">
-              <a:buAutoNum type="arabicPeriod"/>
-            </a:pPr>
-            <a:r>
-              <a:rPr/>
-              <a:t>Generate SQL, PostgREST config and templates</a:t>
-            </a:r>
-          </a:p>
-          <a:p>
-            <a:pPr lvl="0" indent="-342900" marL="342900">
-              <a:buAutoNum type="arabicPeriod"/>
-            </a:pPr>
-            <a:r>
-              <a:rPr/>
-              <a:t>Run generated SQL</a:t>
-            </a:r>
-          </a:p>
-          <a:p>
-            <a:pPr lvl="0" indent="-342900" marL="342900">
-              <a:buAutoNum type="arabicPeriod"/>
-            </a:pPr>
-            <a:r>
-              <a:rPr/>
-              <a:t>Run Newt and Test</a:t>
+            <a:pPr lvl="0"/>
+            <a:r>
+              <a:rPr/>
+              <a:t>The application you want is described in YAML</a:t>
+            </a:r>
+          </a:p>
+          <a:p>
+            <a:pPr lvl="0"/>
+            <a:r>
+              <a:rPr/>
+              <a:t>Newt generates the code you need</a:t>
+            </a:r>
+          </a:p>
+          <a:p>
+            <a:pPr lvl="0"/>
+            <a:r>
+              <a:rPr/>
+              <a:t>Customize by editing the generated code</a:t>
             </a:r>
           </a:p>
         </p:txBody>

</xml_diff>